<commit_message>
v14 Co-authored-by: Miguel Nava <RisingNP@users.noreply.github.com>
</commit_message>
<xml_diff>
--- a/Manual.pptx
+++ b/Manual.pptx
@@ -9,7 +9,8 @@
     <p:sldId id="257" r:id="rId3"/>
     <p:sldId id="259" r:id="rId4"/>
     <p:sldId id="260" r:id="rId5"/>
-    <p:sldId id="261" r:id="rId6"/>
+    <p:sldId id="262" r:id="rId6"/>
+    <p:sldId id="261" r:id="rId7"/>
   </p:sldIdLst>
   <p:sldSz cx="12192000" cy="6858000"/>
   <p:notesSz cx="6858000" cy="9144000"/>
@@ -119,7 +120,7 @@
 <file path=ppt/revisionInfo.xml><?xml version="1.0" encoding="utf-8"?>
 <p1510:revInfo xmlns:a="http://schemas.openxmlformats.org/drawingml/2006/main" xmlns:r="http://schemas.openxmlformats.org/officeDocument/2006/relationships" xmlns:p1510="http://schemas.microsoft.com/office/powerpoint/2015/10/main">
   <p1510:revLst>
-    <p1510:client id="{ADE1B475-4D5F-4688-81F4-BA0250885687}" v="108" dt="2023-11-29T16:28:33.225"/>
+    <p1510:client id="{ADE1B475-4D5F-4688-81F4-BA0250885687}" v="149" dt="2023-11-30T00:17:38.149"/>
   </p1510:revLst>
 </p1510:revInfo>
 </file>
@@ -129,7 +130,7 @@
   <pc:docChgLst>
     <pc:chgData name="Ana Luisa Parra Valencia" userId="6f8c5ed1-ebf7-4aac-9c5a-631253e0ad33" providerId="ADAL" clId="{ADE1B475-4D5F-4688-81F4-BA0250885687}"/>
     <pc:docChg chg="undo custSel addSld delSld modSld sldOrd">
-      <pc:chgData name="Ana Luisa Parra Valencia" userId="6f8c5ed1-ebf7-4aac-9c5a-631253e0ad33" providerId="ADAL" clId="{ADE1B475-4D5F-4688-81F4-BA0250885687}" dt="2023-11-29T16:28:47.057" v="639" actId="20577"/>
+      <pc:chgData name="Ana Luisa Parra Valencia" userId="6f8c5ed1-ebf7-4aac-9c5a-631253e0ad33" providerId="ADAL" clId="{ADE1B475-4D5F-4688-81F4-BA0250885687}" dt="2023-11-30T00:18:02.746" v="935" actId="20577"/>
       <pc:docMkLst>
         <pc:docMk/>
       </pc:docMkLst>
@@ -195,13 +196,13 @@
         </pc:sldMkLst>
       </pc:sldChg>
       <pc:sldChg chg="addSp delSp modSp add mod ord">
-        <pc:chgData name="Ana Luisa Parra Valencia" userId="6f8c5ed1-ebf7-4aac-9c5a-631253e0ad33" providerId="ADAL" clId="{ADE1B475-4D5F-4688-81F4-BA0250885687}" dt="2023-11-29T15:32:41.263" v="309"/>
+        <pc:chgData name="Ana Luisa Parra Valencia" userId="6f8c5ed1-ebf7-4aac-9c5a-631253e0ad33" providerId="ADAL" clId="{ADE1B475-4D5F-4688-81F4-BA0250885687}" dt="2023-11-30T00:14:36.465" v="858" actId="20577"/>
         <pc:sldMkLst>
           <pc:docMk/>
           <pc:sldMk cId="3388250386" sldId="260"/>
         </pc:sldMkLst>
         <pc:spChg chg="add mod">
-          <ac:chgData name="Ana Luisa Parra Valencia" userId="6f8c5ed1-ebf7-4aac-9c5a-631253e0ad33" providerId="ADAL" clId="{ADE1B475-4D5F-4688-81F4-BA0250885687}" dt="2023-11-29T15:28:19.365" v="127" actId="1076"/>
+          <ac:chgData name="Ana Luisa Parra Valencia" userId="6f8c5ed1-ebf7-4aac-9c5a-631253e0ad33" providerId="ADAL" clId="{ADE1B475-4D5F-4688-81F4-BA0250885687}" dt="2023-11-30T00:14:17.388" v="850" actId="20577"/>
           <ac:spMkLst>
             <pc:docMk/>
             <pc:sldMk cId="3388250386" sldId="260"/>
@@ -217,7 +218,7 @@
           </ac:spMkLst>
         </pc:spChg>
         <pc:spChg chg="mod">
-          <ac:chgData name="Ana Luisa Parra Valencia" userId="6f8c5ed1-ebf7-4aac-9c5a-631253e0ad33" providerId="ADAL" clId="{ADE1B475-4D5F-4688-81F4-BA0250885687}" dt="2023-11-29T15:28:19.365" v="127" actId="1076"/>
+          <ac:chgData name="Ana Luisa Parra Valencia" userId="6f8c5ed1-ebf7-4aac-9c5a-631253e0ad33" providerId="ADAL" clId="{ADE1B475-4D5F-4688-81F4-BA0250885687}" dt="2023-11-30T00:14:21.989" v="852" actId="20577"/>
           <ac:spMkLst>
             <pc:docMk/>
             <pc:sldMk cId="3388250386" sldId="260"/>
@@ -233,7 +234,7 @@
           </ac:spMkLst>
         </pc:spChg>
         <pc:spChg chg="mod">
-          <ac:chgData name="Ana Luisa Parra Valencia" userId="6f8c5ed1-ebf7-4aac-9c5a-631253e0ad33" providerId="ADAL" clId="{ADE1B475-4D5F-4688-81F4-BA0250885687}" dt="2023-11-29T15:30:43.987" v="225" actId="1076"/>
+          <ac:chgData name="Ana Luisa Parra Valencia" userId="6f8c5ed1-ebf7-4aac-9c5a-631253e0ad33" providerId="ADAL" clId="{ADE1B475-4D5F-4688-81F4-BA0250885687}" dt="2023-11-30T00:14:36.465" v="858" actId="20577"/>
           <ac:spMkLst>
             <pc:docMk/>
             <pc:sldMk cId="3388250386" sldId="260"/>
@@ -241,7 +242,7 @@
           </ac:spMkLst>
         </pc:spChg>
         <pc:spChg chg="add mod">
-          <ac:chgData name="Ana Luisa Parra Valencia" userId="6f8c5ed1-ebf7-4aac-9c5a-631253e0ad33" providerId="ADAL" clId="{ADE1B475-4D5F-4688-81F4-BA0250885687}" dt="2023-11-29T15:32:20.522" v="295" actId="1076"/>
+          <ac:chgData name="Ana Luisa Parra Valencia" userId="6f8c5ed1-ebf7-4aac-9c5a-631253e0ad33" providerId="ADAL" clId="{ADE1B475-4D5F-4688-81F4-BA0250885687}" dt="2023-11-30T00:14:27.887" v="856" actId="20577"/>
           <ac:spMkLst>
             <pc:docMk/>
             <pc:sldMk cId="3388250386" sldId="260"/>
@@ -322,7 +323,7 @@
         </pc:picChg>
       </pc:sldChg>
       <pc:sldChg chg="addSp delSp modSp add mod">
-        <pc:chgData name="Ana Luisa Parra Valencia" userId="6f8c5ed1-ebf7-4aac-9c5a-631253e0ad33" providerId="ADAL" clId="{ADE1B475-4D5F-4688-81F4-BA0250885687}" dt="2023-11-29T15:41:48.345" v="593" actId="478"/>
+        <pc:chgData name="Ana Luisa Parra Valencia" userId="6f8c5ed1-ebf7-4aac-9c5a-631253e0ad33" providerId="ADAL" clId="{ADE1B475-4D5F-4688-81F4-BA0250885687}" dt="2023-11-30T00:18:02.746" v="935" actId="20577"/>
         <pc:sldMkLst>
           <pc:docMk/>
           <pc:sldMk cId="851140085" sldId="261"/>
@@ -344,7 +345,7 @@
           </ac:spMkLst>
         </pc:spChg>
         <pc:spChg chg="mod">
-          <ac:chgData name="Ana Luisa Parra Valencia" userId="6f8c5ed1-ebf7-4aac-9c5a-631253e0ad33" providerId="ADAL" clId="{ADE1B475-4D5F-4688-81F4-BA0250885687}" dt="2023-11-29T15:38:29.926" v="499" actId="1076"/>
+          <ac:chgData name="Ana Luisa Parra Valencia" userId="6f8c5ed1-ebf7-4aac-9c5a-631253e0ad33" providerId="ADAL" clId="{ADE1B475-4D5F-4688-81F4-BA0250885687}" dt="2023-11-30T00:17:41.607" v="925" actId="1076"/>
           <ac:spMkLst>
             <pc:docMk/>
             <pc:sldMk cId="851140085" sldId="261"/>
@@ -360,7 +361,7 @@
           </ac:spMkLst>
         </pc:spChg>
         <pc:spChg chg="mod">
-          <ac:chgData name="Ana Luisa Parra Valencia" userId="6f8c5ed1-ebf7-4aac-9c5a-631253e0ad33" providerId="ADAL" clId="{ADE1B475-4D5F-4688-81F4-BA0250885687}" dt="2023-11-29T15:38:43.111" v="501" actId="1076"/>
+          <ac:chgData name="Ana Luisa Parra Valencia" userId="6f8c5ed1-ebf7-4aac-9c5a-631253e0ad33" providerId="ADAL" clId="{ADE1B475-4D5F-4688-81F4-BA0250885687}" dt="2023-11-30T00:18:02.746" v="935" actId="20577"/>
           <ac:spMkLst>
             <pc:docMk/>
             <pc:sldMk cId="851140085" sldId="261"/>
@@ -368,7 +369,7 @@
           </ac:spMkLst>
         </pc:spChg>
         <pc:spChg chg="mod">
-          <ac:chgData name="Ana Luisa Parra Valencia" userId="6f8c5ed1-ebf7-4aac-9c5a-631253e0ad33" providerId="ADAL" clId="{ADE1B475-4D5F-4688-81F4-BA0250885687}" dt="2023-11-29T15:38:21.063" v="498" actId="1076"/>
+          <ac:chgData name="Ana Luisa Parra Valencia" userId="6f8c5ed1-ebf7-4aac-9c5a-631253e0ad33" providerId="ADAL" clId="{ADE1B475-4D5F-4688-81F4-BA0250885687}" dt="2023-11-30T00:17:50.506" v="929" actId="20577"/>
           <ac:spMkLst>
             <pc:docMk/>
             <pc:sldMk cId="851140085" sldId="261"/>
@@ -376,7 +377,7 @@
           </ac:spMkLst>
         </pc:spChg>
         <pc:spChg chg="add mod">
-          <ac:chgData name="Ana Luisa Parra Valencia" userId="6f8c5ed1-ebf7-4aac-9c5a-631253e0ad33" providerId="ADAL" clId="{ADE1B475-4D5F-4688-81F4-BA0250885687}" dt="2023-11-29T15:38:21.063" v="498" actId="1076"/>
+          <ac:chgData name="Ana Luisa Parra Valencia" userId="6f8c5ed1-ebf7-4aac-9c5a-631253e0ad33" providerId="ADAL" clId="{ADE1B475-4D5F-4688-81F4-BA0250885687}" dt="2023-11-30T00:17:44.532" v="927" actId="20577"/>
           <ac:spMkLst>
             <pc:docMk/>
             <pc:sldMk cId="851140085" sldId="261"/>
@@ -384,7 +385,7 @@
           </ac:spMkLst>
         </pc:spChg>
         <pc:spChg chg="add mod">
-          <ac:chgData name="Ana Luisa Parra Valencia" userId="6f8c5ed1-ebf7-4aac-9c5a-631253e0ad33" providerId="ADAL" clId="{ADE1B475-4D5F-4688-81F4-BA0250885687}" dt="2023-11-29T15:39:35.902" v="522" actId="1076"/>
+          <ac:chgData name="Ana Luisa Parra Valencia" userId="6f8c5ed1-ebf7-4aac-9c5a-631253e0ad33" providerId="ADAL" clId="{ADE1B475-4D5F-4688-81F4-BA0250885687}" dt="2023-11-30T00:17:55.549" v="931" actId="20577"/>
           <ac:spMkLst>
             <pc:docMk/>
             <pc:sldMk cId="851140085" sldId="261"/>
@@ -392,7 +393,7 @@
           </ac:spMkLst>
         </pc:spChg>
         <pc:spChg chg="add mod">
-          <ac:chgData name="Ana Luisa Parra Valencia" userId="6f8c5ed1-ebf7-4aac-9c5a-631253e0ad33" providerId="ADAL" clId="{ADE1B475-4D5F-4688-81F4-BA0250885687}" dt="2023-11-29T15:40:22.894" v="551" actId="1076"/>
+          <ac:chgData name="Ana Luisa Parra Valencia" userId="6f8c5ed1-ebf7-4aac-9c5a-631253e0ad33" providerId="ADAL" clId="{ADE1B475-4D5F-4688-81F4-BA0250885687}" dt="2023-11-30T00:17:58.625" v="933" actId="20577"/>
           <ac:spMkLst>
             <pc:docMk/>
             <pc:sldMk cId="851140085" sldId="261"/>
@@ -400,7 +401,7 @@
           </ac:spMkLst>
         </pc:spChg>
         <pc:spChg chg="add mod">
-          <ac:chgData name="Ana Luisa Parra Valencia" userId="6f8c5ed1-ebf7-4aac-9c5a-631253e0ad33" providerId="ADAL" clId="{ADE1B475-4D5F-4688-81F4-BA0250885687}" dt="2023-11-29T15:41:16.676" v="589" actId="1076"/>
+          <ac:chgData name="Ana Luisa Parra Valencia" userId="6f8c5ed1-ebf7-4aac-9c5a-631253e0ad33" providerId="ADAL" clId="{ADE1B475-4D5F-4688-81F4-BA0250885687}" dt="2023-11-30T00:17:26.468" v="920" actId="20577"/>
           <ac:spMkLst>
             <pc:docMk/>
             <pc:sldMk cId="851140085" sldId="261"/>
@@ -423,8 +424,8 @@
             <ac:picMk id="5" creationId="{358C3186-94F0-3B81-8C70-3314ADEA8BAC}"/>
           </ac:picMkLst>
         </pc:picChg>
-        <pc:picChg chg="mod">
-          <ac:chgData name="Ana Luisa Parra Valencia" userId="6f8c5ed1-ebf7-4aac-9c5a-631253e0ad33" providerId="ADAL" clId="{ADE1B475-4D5F-4688-81F4-BA0250885687}" dt="2023-11-29T15:38:21.063" v="498" actId="1076"/>
+        <pc:picChg chg="del mod">
+          <ac:chgData name="Ana Luisa Parra Valencia" userId="6f8c5ed1-ebf7-4aac-9c5a-631253e0ad33" providerId="ADAL" clId="{ADE1B475-4D5F-4688-81F4-BA0250885687}" dt="2023-11-30T00:08:44.442" v="666" actId="478"/>
           <ac:picMkLst>
             <pc:docMk/>
             <pc:sldMk cId="851140085" sldId="261"/>
@@ -480,7 +481,7 @@
           </ac:picMkLst>
         </pc:picChg>
         <pc:picChg chg="mod">
-          <ac:chgData name="Ana Luisa Parra Valencia" userId="6f8c5ed1-ebf7-4aac-9c5a-631253e0ad33" providerId="ADAL" clId="{ADE1B475-4D5F-4688-81F4-BA0250885687}" dt="2023-11-29T15:38:21.063" v="498" actId="1076"/>
+          <ac:chgData name="Ana Luisa Parra Valencia" userId="6f8c5ed1-ebf7-4aac-9c5a-631253e0ad33" providerId="ADAL" clId="{ADE1B475-4D5F-4688-81F4-BA0250885687}" dt="2023-11-30T00:17:38.149" v="924" actId="14100"/>
           <ac:picMkLst>
             <pc:docMk/>
             <pc:sldMk cId="851140085" sldId="261"/>
@@ -493,6 +494,205 @@
             <pc:docMk/>
             <pc:sldMk cId="851140085" sldId="261"/>
             <ac:picMk id="3074" creationId="{90665673-3485-F178-E521-CB955E74CDC7}"/>
+          </ac:picMkLst>
+        </pc:picChg>
+      </pc:sldChg>
+      <pc:sldChg chg="addSp delSp modSp add mod ord">
+        <pc:chgData name="Ana Luisa Parra Valencia" userId="6f8c5ed1-ebf7-4aac-9c5a-631253e0ad33" providerId="ADAL" clId="{ADE1B475-4D5F-4688-81F4-BA0250885687}" dt="2023-11-30T00:17:04.983" v="918" actId="14100"/>
+        <pc:sldMkLst>
+          <pc:docMk/>
+          <pc:sldMk cId="3996274440" sldId="262"/>
+        </pc:sldMkLst>
+        <pc:spChg chg="mod">
+          <ac:chgData name="Ana Luisa Parra Valencia" userId="6f8c5ed1-ebf7-4aac-9c5a-631253e0ad33" providerId="ADAL" clId="{ADE1B475-4D5F-4688-81F4-BA0250885687}" dt="2023-11-30T00:13:58.908" v="848" actId="1076"/>
+          <ac:spMkLst>
+            <pc:docMk/>
+            <pc:sldMk cId="3996274440" sldId="262"/>
+            <ac:spMk id="4" creationId="{337DBBC9-E58D-54F8-4D86-3DE9418DE62F}"/>
+          </ac:spMkLst>
+        </pc:spChg>
+        <pc:spChg chg="mod">
+          <ac:chgData name="Ana Luisa Parra Valencia" userId="6f8c5ed1-ebf7-4aac-9c5a-631253e0ad33" providerId="ADAL" clId="{ADE1B475-4D5F-4688-81F4-BA0250885687}" dt="2023-11-30T00:05:19.448" v="664" actId="1076"/>
+          <ac:spMkLst>
+            <pc:docMk/>
+            <pc:sldMk cId="3996274440" sldId="262"/>
+            <ac:spMk id="6" creationId="{12812828-FAAD-6AB7-DDCC-EFFE5F6C0863}"/>
+          </ac:spMkLst>
+        </pc:spChg>
+        <pc:spChg chg="mod">
+          <ac:chgData name="Ana Luisa Parra Valencia" userId="6f8c5ed1-ebf7-4aac-9c5a-631253e0ad33" providerId="ADAL" clId="{ADE1B475-4D5F-4688-81F4-BA0250885687}" dt="2023-11-30T00:14:43.508" v="861" actId="20577"/>
+          <ac:spMkLst>
+            <pc:docMk/>
+            <pc:sldMk cId="3996274440" sldId="262"/>
+            <ac:spMk id="7" creationId="{3BD640C0-ABC6-5A36-8DC9-030D6533BB07}"/>
+          </ac:spMkLst>
+        </pc:spChg>
+        <pc:spChg chg="mod">
+          <ac:chgData name="Ana Luisa Parra Valencia" userId="6f8c5ed1-ebf7-4aac-9c5a-631253e0ad33" providerId="ADAL" clId="{ADE1B475-4D5F-4688-81F4-BA0250885687}" dt="2023-11-30T00:14:56.947" v="864" actId="20577"/>
+          <ac:spMkLst>
+            <pc:docMk/>
+            <pc:sldMk cId="3996274440" sldId="262"/>
+            <ac:spMk id="11" creationId="{E5498E99-DC67-FFF0-C870-51A575355FFA}"/>
+          </ac:spMkLst>
+        </pc:spChg>
+        <pc:spChg chg="del">
+          <ac:chgData name="Ana Luisa Parra Valencia" userId="6f8c5ed1-ebf7-4aac-9c5a-631253e0ad33" providerId="ADAL" clId="{ADE1B475-4D5F-4688-81F4-BA0250885687}" dt="2023-11-30T00:12:51.596" v="788" actId="478"/>
+          <ac:spMkLst>
+            <pc:docMk/>
+            <pc:sldMk cId="3996274440" sldId="262"/>
+            <ac:spMk id="13" creationId="{F757221B-7E42-1CBE-E129-671680E30703}"/>
+          </ac:spMkLst>
+        </pc:spChg>
+        <pc:spChg chg="del">
+          <ac:chgData name="Ana Luisa Parra Valencia" userId="6f8c5ed1-ebf7-4aac-9c5a-631253e0ad33" providerId="ADAL" clId="{ADE1B475-4D5F-4688-81F4-BA0250885687}" dt="2023-11-30T00:12:53.932" v="789" actId="478"/>
+          <ac:spMkLst>
+            <pc:docMk/>
+            <pc:sldMk cId="3996274440" sldId="262"/>
+            <ac:spMk id="14" creationId="{1874081A-DA6C-33E4-A95B-8729900318DC}"/>
+          </ac:spMkLst>
+        </pc:spChg>
+        <pc:spChg chg="add mod">
+          <ac:chgData name="Ana Luisa Parra Valencia" userId="6f8c5ed1-ebf7-4aac-9c5a-631253e0ad33" providerId="ADAL" clId="{ADE1B475-4D5F-4688-81F4-BA0250885687}" dt="2023-11-30T00:13:58.908" v="848" actId="1076"/>
+          <ac:spMkLst>
+            <pc:docMk/>
+            <pc:sldMk cId="3996274440" sldId="262"/>
+            <ac:spMk id="17" creationId="{8D24D682-312E-E7FF-0C2E-0549679828B1}"/>
+          </ac:spMkLst>
+        </pc:spChg>
+        <pc:spChg chg="add mod">
+          <ac:chgData name="Ana Luisa Parra Valencia" userId="6f8c5ed1-ebf7-4aac-9c5a-631253e0ad33" providerId="ADAL" clId="{ADE1B475-4D5F-4688-81F4-BA0250885687}" dt="2023-11-30T00:13:58.908" v="848" actId="1076"/>
+          <ac:spMkLst>
+            <pc:docMk/>
+            <pc:sldMk cId="3996274440" sldId="262"/>
+            <ac:spMk id="18" creationId="{97443BE6-D2F0-CBC9-D1D3-2CF8A0317605}"/>
+          </ac:spMkLst>
+        </pc:spChg>
+        <pc:spChg chg="add mod">
+          <ac:chgData name="Ana Luisa Parra Valencia" userId="6f8c5ed1-ebf7-4aac-9c5a-631253e0ad33" providerId="ADAL" clId="{ADE1B475-4D5F-4688-81F4-BA0250885687}" dt="2023-11-30T00:13:58.908" v="848" actId="1076"/>
+          <ac:spMkLst>
+            <pc:docMk/>
+            <pc:sldMk cId="3996274440" sldId="262"/>
+            <ac:spMk id="19" creationId="{4F7AECF9-CB55-B744-A7BB-2E61F12247A3}"/>
+          </ac:spMkLst>
+        </pc:spChg>
+        <pc:spChg chg="add mod">
+          <ac:chgData name="Ana Luisa Parra Valencia" userId="6f8c5ed1-ebf7-4aac-9c5a-631253e0ad33" providerId="ADAL" clId="{ADE1B475-4D5F-4688-81F4-BA0250885687}" dt="2023-11-30T00:13:58.908" v="848" actId="1076"/>
+          <ac:spMkLst>
+            <pc:docMk/>
+            <pc:sldMk cId="3996274440" sldId="262"/>
+            <ac:spMk id="20" creationId="{4BD60602-79B1-C581-A985-0FE3DD5253F1}"/>
+          </ac:spMkLst>
+        </pc:spChg>
+        <pc:spChg chg="add mod">
+          <ac:chgData name="Ana Luisa Parra Valencia" userId="6f8c5ed1-ebf7-4aac-9c5a-631253e0ad33" providerId="ADAL" clId="{ADE1B475-4D5F-4688-81F4-BA0250885687}" dt="2023-11-30T00:15:55.577" v="882" actId="1076"/>
+          <ac:spMkLst>
+            <pc:docMk/>
+            <pc:sldMk cId="3996274440" sldId="262"/>
+            <ac:spMk id="23" creationId="{446CC9A7-5A8C-39AB-F2A1-E2BFAF13A8FC}"/>
+          </ac:spMkLst>
+        </pc:spChg>
+        <pc:spChg chg="add mod">
+          <ac:chgData name="Ana Luisa Parra Valencia" userId="6f8c5ed1-ebf7-4aac-9c5a-631253e0ad33" providerId="ADAL" clId="{ADE1B475-4D5F-4688-81F4-BA0250885687}" dt="2023-11-30T00:16:45.775" v="904" actId="1076"/>
+          <ac:spMkLst>
+            <pc:docMk/>
+            <pc:sldMk cId="3996274440" sldId="262"/>
+            <ac:spMk id="24" creationId="{DF1687FB-0F3F-11BB-D463-65948984C6B1}"/>
+          </ac:spMkLst>
+        </pc:spChg>
+        <pc:spChg chg="add mod">
+          <ac:chgData name="Ana Luisa Parra Valencia" userId="6f8c5ed1-ebf7-4aac-9c5a-631253e0ad33" providerId="ADAL" clId="{ADE1B475-4D5F-4688-81F4-BA0250885687}" dt="2023-11-30T00:17:04.983" v="918" actId="14100"/>
+          <ac:spMkLst>
+            <pc:docMk/>
+            <pc:sldMk cId="3996274440" sldId="262"/>
+            <ac:spMk id="25" creationId="{E5F84604-C110-221C-A4D7-954BCF6F08EB}"/>
+          </ac:spMkLst>
+        </pc:spChg>
+        <pc:picChg chg="del">
+          <ac:chgData name="Ana Luisa Parra Valencia" userId="6f8c5ed1-ebf7-4aac-9c5a-631253e0ad33" providerId="ADAL" clId="{ADE1B475-4D5F-4688-81F4-BA0250885687}" dt="2023-11-30T00:05:23.174" v="665" actId="478"/>
+          <ac:picMkLst>
+            <pc:docMk/>
+            <pc:sldMk cId="3996274440" sldId="262"/>
+            <ac:picMk id="3" creationId="{7D5B2ECC-06DF-F8E7-B100-5A580495B0CC}"/>
+          </ac:picMkLst>
+        </pc:picChg>
+        <pc:picChg chg="add mod ord">
+          <ac:chgData name="Ana Luisa Parra Valencia" userId="6f8c5ed1-ebf7-4aac-9c5a-631253e0ad33" providerId="ADAL" clId="{ADE1B475-4D5F-4688-81F4-BA0250885687}" dt="2023-11-30T00:13:58.908" v="848" actId="1076"/>
+          <ac:picMkLst>
+            <pc:docMk/>
+            <pc:sldMk cId="3996274440" sldId="262"/>
+            <ac:picMk id="5" creationId="{081A7299-F60E-8164-CFC0-BBCD5C74806C}"/>
+          </ac:picMkLst>
+        </pc:picChg>
+        <pc:picChg chg="mod">
+          <ac:chgData name="Ana Luisa Parra Valencia" userId="6f8c5ed1-ebf7-4aac-9c5a-631253e0ad33" providerId="ADAL" clId="{ADE1B475-4D5F-4688-81F4-BA0250885687}" dt="2023-11-30T00:13:58.908" v="848" actId="1076"/>
+          <ac:picMkLst>
+            <pc:docMk/>
+            <pc:sldMk cId="3996274440" sldId="262"/>
+            <ac:picMk id="8" creationId="{642AC207-7EE2-03A3-594D-23B8F11F75DF}"/>
+          </ac:picMkLst>
+        </pc:picChg>
+        <pc:picChg chg="add mod">
+          <ac:chgData name="Ana Luisa Parra Valencia" userId="6f8c5ed1-ebf7-4aac-9c5a-631253e0ad33" providerId="ADAL" clId="{ADE1B475-4D5F-4688-81F4-BA0250885687}" dt="2023-11-30T00:13:58.908" v="848" actId="1076"/>
+          <ac:picMkLst>
+            <pc:docMk/>
+            <pc:sldMk cId="3996274440" sldId="262"/>
+            <ac:picMk id="9" creationId="{992CF033-AFA6-0D1D-4DD5-80FCA68C2B12}"/>
+          </ac:picMkLst>
+        </pc:picChg>
+        <pc:picChg chg="mod">
+          <ac:chgData name="Ana Luisa Parra Valencia" userId="6f8c5ed1-ebf7-4aac-9c5a-631253e0ad33" providerId="ADAL" clId="{ADE1B475-4D5F-4688-81F4-BA0250885687}" dt="2023-11-30T00:13:58.908" v="848" actId="1076"/>
+          <ac:picMkLst>
+            <pc:docMk/>
+            <pc:sldMk cId="3996274440" sldId="262"/>
+            <ac:picMk id="10" creationId="{08E2ED56-0C5B-8355-171B-818FECCED02D}"/>
+          </ac:picMkLst>
+        </pc:picChg>
+        <pc:picChg chg="mod">
+          <ac:chgData name="Ana Luisa Parra Valencia" userId="6f8c5ed1-ebf7-4aac-9c5a-631253e0ad33" providerId="ADAL" clId="{ADE1B475-4D5F-4688-81F4-BA0250885687}" dt="2023-11-30T00:13:58.908" v="848" actId="1076"/>
+          <ac:picMkLst>
+            <pc:docMk/>
+            <pc:sldMk cId="3996274440" sldId="262"/>
+            <ac:picMk id="12" creationId="{C1F5E0A1-ADF1-02DD-8318-FAEF9D389191}"/>
+          </ac:picMkLst>
+        </pc:picChg>
+        <pc:picChg chg="mod">
+          <ac:chgData name="Ana Luisa Parra Valencia" userId="6f8c5ed1-ebf7-4aac-9c5a-631253e0ad33" providerId="ADAL" clId="{ADE1B475-4D5F-4688-81F4-BA0250885687}" dt="2023-11-30T00:13:58.908" v="848" actId="1076"/>
+          <ac:picMkLst>
+            <pc:docMk/>
+            <pc:sldMk cId="3996274440" sldId="262"/>
+            <ac:picMk id="15" creationId="{C47CA9A1-8B08-2C5F-9872-068310648802}"/>
+          </ac:picMkLst>
+        </pc:picChg>
+        <pc:picChg chg="add mod">
+          <ac:chgData name="Ana Luisa Parra Valencia" userId="6f8c5ed1-ebf7-4aac-9c5a-631253e0ad33" providerId="ADAL" clId="{ADE1B475-4D5F-4688-81F4-BA0250885687}" dt="2023-11-30T00:13:58.908" v="848" actId="1076"/>
+          <ac:picMkLst>
+            <pc:docMk/>
+            <pc:sldMk cId="3996274440" sldId="262"/>
+            <ac:picMk id="16" creationId="{32749115-0A91-3F1E-68E5-5E7C067B7321}"/>
+          </ac:picMkLst>
+        </pc:picChg>
+        <pc:picChg chg="add mod">
+          <ac:chgData name="Ana Luisa Parra Valencia" userId="6f8c5ed1-ebf7-4aac-9c5a-631253e0ad33" providerId="ADAL" clId="{ADE1B475-4D5F-4688-81F4-BA0250885687}" dt="2023-11-30T00:15:25.047" v="870" actId="14100"/>
+          <ac:picMkLst>
+            <pc:docMk/>
+            <pc:sldMk cId="3996274440" sldId="262"/>
+            <ac:picMk id="21" creationId="{A09A13F2-5E26-6799-54E9-2D8061753EF2}"/>
+          </ac:picMkLst>
+        </pc:picChg>
+        <pc:picChg chg="add del mod">
+          <ac:chgData name="Ana Luisa Parra Valencia" userId="6f8c5ed1-ebf7-4aac-9c5a-631253e0ad33" providerId="ADAL" clId="{ADE1B475-4D5F-4688-81F4-BA0250885687}" dt="2023-11-30T00:15:30.380" v="872"/>
+          <ac:picMkLst>
+            <pc:docMk/>
+            <pc:sldMk cId="3996274440" sldId="262"/>
+            <ac:picMk id="22" creationId="{9767776F-290E-793B-391B-556D802F7A83}"/>
+          </ac:picMkLst>
+        </pc:picChg>
+        <pc:picChg chg="mod">
+          <ac:chgData name="Ana Luisa Parra Valencia" userId="6f8c5ed1-ebf7-4aac-9c5a-631253e0ad33" providerId="ADAL" clId="{ADE1B475-4D5F-4688-81F4-BA0250885687}" dt="2023-11-30T00:13:58.908" v="848" actId="1076"/>
+          <ac:picMkLst>
+            <pc:docMk/>
+            <pc:sldMk cId="3996274440" sldId="262"/>
+            <ac:picMk id="2050" creationId="{E931B4D5-2D2C-3C3C-5A89-788C85395FF9}"/>
           </ac:picMkLst>
         </pc:picChg>
       </pc:sldChg>
@@ -5245,7 +5445,7 @@
                 <a:latin typeface="212 Baby Girl" pitchFamily="50" charset="0"/>
                 <a:ea typeface="A little sunshine" panose="02000603000000000000" pitchFamily="2" charset="0"/>
               </a:rPr>
-              <a:t>Seleccionar el tipo de corte</a:t>
+              <a:t>2.Seleccionar el tipo de corte</a:t>
             </a:r>
           </a:p>
         </p:txBody>
@@ -5413,18 +5613,11 @@
           <a:p>
             <a:pPr algn="ctr"/>
             <a:r>
-              <a:rPr lang="es-CO" dirty="0" err="1">
-                <a:latin typeface="212 Baby Girl" pitchFamily="50" charset="0"/>
-                <a:ea typeface="A little sunshine" panose="02000603000000000000" pitchFamily="2" charset="0"/>
-              </a:rPr>
-              <a:t>Click</a:t>
-            </a:r>
-            <a:r>
               <a:rPr lang="es-CO" dirty="0">
                 <a:latin typeface="212 Baby Girl" pitchFamily="50" charset="0"/>
                 <a:ea typeface="A little sunshine" panose="02000603000000000000" pitchFamily="2" charset="0"/>
               </a:rPr>
-              <a:t> para regresar al menú</a:t>
+              <a:t>4.Click para regresar al menú</a:t>
             </a:r>
           </a:p>
         </p:txBody>
@@ -5463,7 +5656,7 @@
                 <a:latin typeface="212 Baby Girl" pitchFamily="50" charset="0"/>
                 <a:ea typeface="A little sunshine" panose="02000603000000000000" pitchFamily="2" charset="0"/>
               </a:rPr>
-              <a:t>Seleccionar la carpeta a visualizar</a:t>
+              <a:t>1.Seleccionar la carpeta a visualizar</a:t>
             </a:r>
           </a:p>
         </p:txBody>
@@ -5549,7 +5742,7 @@
                 <a:latin typeface="212 Baby Girl" pitchFamily="50" charset="0"/>
                 <a:ea typeface="A little sunshine" panose="02000603000000000000" pitchFamily="2" charset="0"/>
               </a:rPr>
-              <a:t>Navegar por las imágenes </a:t>
+              <a:t>3.Navegar por las imágenes </a:t>
             </a:r>
           </a:p>
         </p:txBody>
@@ -5589,7 +5782,7 @@
           <p:cNvPr id="5" name="Picture 4">
             <a:extLst>
               <a:ext uri="{FF2B5EF4-FFF2-40B4-BE49-F238E27FC236}">
-                <a16:creationId xmlns:a16="http://schemas.microsoft.com/office/drawing/2014/main" id="{358C3186-94F0-3B81-8C70-3314ADEA8BAC}"/>
+                <a16:creationId xmlns:a16="http://schemas.microsoft.com/office/drawing/2014/main" id="{081A7299-F60E-8164-CFC0-BBCD5C74806C}"/>
               </a:ext>
             </a:extLst>
           </p:cNvPr>
@@ -5606,8 +5799,8 @@
         </p:blipFill>
         <p:spPr>
           <a:xfrm>
-            <a:off x="2108195" y="893339"/>
-            <a:ext cx="8847036" cy="5400000"/>
+            <a:off x="3085883" y="1320925"/>
+            <a:ext cx="8745170" cy="4715533"/>
           </a:xfrm>
           <a:prstGeom prst="rect">
             <a:avLst/>
@@ -5628,8 +5821,8 @@
         </p:nvSpPr>
         <p:spPr>
           <a:xfrm>
-            <a:off x="505325" y="62067"/>
-            <a:ext cx="5065295" cy="1015663"/>
+            <a:off x="360947" y="-22468"/>
+            <a:ext cx="6472990" cy="1015663"/>
           </a:xfrm>
           <a:prstGeom prst="rect">
             <a:avLst/>
@@ -5647,7 +5840,7 @@
                 <a:latin typeface="Friendly Schoolmates" panose="02000500000000000000" pitchFamily="2" charset="0"/>
                 <a:ea typeface="A little sunshine" panose="02000603000000000000" pitchFamily="2" charset="0"/>
               </a:rPr>
-              <a:t>ARCHIVOS MAT</a:t>
+              <a:t>ARCHIVOS JPG /PNG</a:t>
             </a:r>
           </a:p>
         </p:txBody>
@@ -5680,9 +5873,9 @@
           </a:stretch>
         </p:blipFill>
         <p:spPr bwMode="auto">
-          <a:xfrm flipV="1">
-            <a:off x="9871217" y="1794080"/>
-            <a:ext cx="805979" cy="709864"/>
+          <a:xfrm flipH="1">
+            <a:off x="2436174" y="1193176"/>
+            <a:ext cx="1540040" cy="709864"/>
           </a:xfrm>
           <a:prstGeom prst="rect">
             <a:avLst/>
@@ -5713,8 +5906,8 @@
         </p:nvSpPr>
         <p:spPr>
           <a:xfrm>
-            <a:off x="10472660" y="1948378"/>
-            <a:ext cx="1925053" cy="646331"/>
+            <a:off x="162204" y="1193176"/>
+            <a:ext cx="2434393" cy="646331"/>
           </a:xfrm>
           <a:prstGeom prst="rect">
             <a:avLst/>
@@ -5733,7 +5926,21 @@
                 <a:latin typeface="212 Baby Girl" pitchFamily="50" charset="0"/>
                 <a:ea typeface="A little sunshine" panose="02000603000000000000" pitchFamily="2" charset="0"/>
               </a:rPr>
-              <a:t>Seleccionar el arreglo</a:t>
+              <a:t>1. </a:t>
+            </a:r>
+            <a:r>
+              <a:rPr lang="es-CO" dirty="0" err="1">
+                <a:latin typeface="212 Baby Girl" pitchFamily="50" charset="0"/>
+                <a:ea typeface="A little sunshine" panose="02000603000000000000" pitchFamily="2" charset="0"/>
+              </a:rPr>
+              <a:t>Click</a:t>
+            </a:r>
+            <a:r>
+              <a:rPr lang="es-CO" dirty="0">
+                <a:latin typeface="212 Baby Girl" pitchFamily="50" charset="0"/>
+                <a:ea typeface="A little sunshine" panose="02000603000000000000" pitchFamily="2" charset="0"/>
+              </a:rPr>
+              <a:t> para cargar la imagen</a:t>
             </a:r>
           </a:p>
         </p:txBody>
@@ -5766,9 +5973,9 @@
           </a:stretch>
         </p:blipFill>
         <p:spPr bwMode="auto">
-          <a:xfrm rot="5400000">
-            <a:off x="5596774" y="1658926"/>
-            <a:ext cx="912990" cy="709864"/>
+          <a:xfrm>
+            <a:off x="8253439" y="1548108"/>
+            <a:ext cx="1540040" cy="709864"/>
           </a:xfrm>
           <a:prstGeom prst="rect">
             <a:avLst/>
@@ -5813,9 +6020,9 @@
           </a:stretch>
         </p:blipFill>
         <p:spPr bwMode="auto">
-          <a:xfrm rot="10800000">
-            <a:off x="1992916" y="5364496"/>
-            <a:ext cx="719081" cy="709864"/>
+          <a:xfrm rot="16200000" flipH="1">
+            <a:off x="4557224" y="3825596"/>
+            <a:ext cx="1003674" cy="709864"/>
           </a:xfrm>
           <a:prstGeom prst="rect">
             <a:avLst/>
@@ -5846,7 +6053,7 @@
         </p:nvSpPr>
         <p:spPr>
           <a:xfrm>
-            <a:off x="228955" y="5544747"/>
+            <a:off x="4096534" y="4733244"/>
             <a:ext cx="1925053" cy="646331"/>
           </a:xfrm>
           <a:prstGeom prst="rect">
@@ -5861,6 +6068,13 @@
           <a:lstStyle/>
           <a:p>
             <a:pPr algn="ctr"/>
+            <a:r>
+              <a:rPr lang="es-CO" dirty="0">
+                <a:latin typeface="212 Baby Girl" pitchFamily="50" charset="0"/>
+                <a:ea typeface="A little sunshine" panose="02000603000000000000" pitchFamily="2" charset="0"/>
+              </a:rPr>
+              <a:t>3. </a:t>
+            </a:r>
             <a:r>
               <a:rPr lang="es-CO" dirty="0" err="1">
                 <a:latin typeface="212 Baby Girl" pitchFamily="50" charset="0"/>
@@ -5874,6 +6088,865 @@
                 <a:ea typeface="A little sunshine" panose="02000603000000000000" pitchFamily="2" charset="0"/>
               </a:rPr>
               <a:t> para regresar al menú</a:t>
+            </a:r>
+          </a:p>
+        </p:txBody>
+      </p:sp>
+      <p:sp>
+        <p:nvSpPr>
+          <p:cNvPr id="4" name="TextBox 3">
+            <a:extLst>
+              <a:ext uri="{FF2B5EF4-FFF2-40B4-BE49-F238E27FC236}">
+                <a16:creationId xmlns:a16="http://schemas.microsoft.com/office/drawing/2014/main" id="{337DBBC9-E58D-54F8-4D86-3DE9418DE62F}"/>
+              </a:ext>
+            </a:extLst>
+          </p:cNvPr>
+          <p:cNvSpPr txBox="1"/>
+          <p:nvPr/>
+        </p:nvSpPr>
+        <p:spPr>
+          <a:xfrm>
+            <a:off x="162204" y="1975937"/>
+            <a:ext cx="2250918" cy="646331"/>
+          </a:xfrm>
+          <a:prstGeom prst="rect">
+            <a:avLst/>
+          </a:prstGeom>
+          <a:noFill/>
+        </p:spPr>
+        <p:txBody>
+          <a:bodyPr wrap="square" rtlCol="0">
+            <a:spAutoFit/>
+          </a:bodyPr>
+          <a:lstStyle/>
+          <a:p>
+            <a:pPr algn="ctr"/>
+            <a:r>
+              <a:rPr lang="es-CO" dirty="0" err="1">
+                <a:latin typeface="212 Baby Girl" pitchFamily="50" charset="0"/>
+                <a:ea typeface="A little sunshine" panose="02000603000000000000" pitchFamily="2" charset="0"/>
+              </a:rPr>
+              <a:t>Click</a:t>
+            </a:r>
+            <a:r>
+              <a:rPr lang="es-CO" dirty="0">
+                <a:latin typeface="212 Baby Girl" pitchFamily="50" charset="0"/>
+                <a:ea typeface="A little sunshine" panose="02000603000000000000" pitchFamily="2" charset="0"/>
+              </a:rPr>
+              <a:t> para dilatar la imagen</a:t>
+            </a:r>
+          </a:p>
+        </p:txBody>
+      </p:sp>
+      <p:pic>
+        <p:nvPicPr>
+          <p:cNvPr id="12" name="Picture 2" descr="Right arrow - Free arrows icons">
+            <a:extLst>
+              <a:ext uri="{FF2B5EF4-FFF2-40B4-BE49-F238E27FC236}">
+                <a16:creationId xmlns:a16="http://schemas.microsoft.com/office/drawing/2014/main" id="{C1F5E0A1-ADF1-02DD-8318-FAEF9D389191}"/>
+              </a:ext>
+            </a:extLst>
+          </p:cNvPr>
+          <p:cNvPicPr>
+            <a:picLocks noChangeAspect="1" noChangeArrowheads="1"/>
+          </p:cNvPicPr>
+          <p:nvPr/>
+        </p:nvPicPr>
+        <p:blipFill>
+          <a:blip r:embed="rId3">
+            <a:extLst>
+              <a:ext uri="{28A0092B-C50C-407E-A947-70E740481C1C}">
+                <a14:useLocalDpi xmlns:a14="http://schemas.microsoft.com/office/drawing/2010/main" val="0"/>
+              </a:ext>
+            </a:extLst>
+          </a:blip>
+          <a:srcRect/>
+          <a:stretch>
+            <a:fillRect/>
+          </a:stretch>
+        </p:blipFill>
+        <p:spPr bwMode="auto">
+          <a:xfrm flipH="1">
+            <a:off x="2436174" y="1888914"/>
+            <a:ext cx="1540040" cy="709864"/>
+          </a:xfrm>
+          <a:prstGeom prst="rect">
+            <a:avLst/>
+          </a:prstGeom>
+          <a:noFill/>
+          <a:extLst>
+            <a:ext uri="{909E8E84-426E-40DD-AFC4-6F175D3DCCD1}">
+              <a14:hiddenFill xmlns:a14="http://schemas.microsoft.com/office/drawing/2010/main">
+                <a:solidFill>
+                  <a:srgbClr val="FFFFFF"/>
+                </a:solidFill>
+              </a14:hiddenFill>
+            </a:ext>
+          </a:extLst>
+        </p:spPr>
+      </p:pic>
+      <p:pic>
+        <p:nvPicPr>
+          <p:cNvPr id="15" name="Picture 2" descr="Right arrow - Free arrows icons">
+            <a:extLst>
+              <a:ext uri="{FF2B5EF4-FFF2-40B4-BE49-F238E27FC236}">
+                <a16:creationId xmlns:a16="http://schemas.microsoft.com/office/drawing/2014/main" id="{C47CA9A1-8B08-2C5F-9872-068310648802}"/>
+              </a:ext>
+            </a:extLst>
+          </p:cNvPr>
+          <p:cNvPicPr>
+            <a:picLocks noChangeAspect="1" noChangeArrowheads="1"/>
+          </p:cNvPicPr>
+          <p:nvPr/>
+        </p:nvPicPr>
+        <p:blipFill>
+          <a:blip r:embed="rId3">
+            <a:extLst>
+              <a:ext uri="{28A0092B-C50C-407E-A947-70E740481C1C}">
+                <a14:useLocalDpi xmlns:a14="http://schemas.microsoft.com/office/drawing/2010/main" val="0"/>
+              </a:ext>
+            </a:extLst>
+          </a:blip>
+          <a:srcRect/>
+          <a:stretch>
+            <a:fillRect/>
+          </a:stretch>
+        </p:blipFill>
+        <p:spPr bwMode="auto">
+          <a:xfrm flipH="1">
+            <a:off x="2436174" y="2598778"/>
+            <a:ext cx="1540040" cy="709864"/>
+          </a:xfrm>
+          <a:prstGeom prst="rect">
+            <a:avLst/>
+          </a:prstGeom>
+          <a:noFill/>
+          <a:extLst>
+            <a:ext uri="{909E8E84-426E-40DD-AFC4-6F175D3DCCD1}">
+              <a14:hiddenFill xmlns:a14="http://schemas.microsoft.com/office/drawing/2010/main">
+                <a:solidFill>
+                  <a:srgbClr val="FFFFFF"/>
+                </a:solidFill>
+              </a14:hiddenFill>
+            </a:ext>
+          </a:extLst>
+        </p:spPr>
+      </p:pic>
+      <p:pic>
+        <p:nvPicPr>
+          <p:cNvPr id="9" name="Picture 2" descr="Right arrow - Free arrows icons">
+            <a:extLst>
+              <a:ext uri="{FF2B5EF4-FFF2-40B4-BE49-F238E27FC236}">
+                <a16:creationId xmlns:a16="http://schemas.microsoft.com/office/drawing/2014/main" id="{992CF033-AFA6-0D1D-4DD5-80FCA68C2B12}"/>
+              </a:ext>
+            </a:extLst>
+          </p:cNvPr>
+          <p:cNvPicPr>
+            <a:picLocks noChangeAspect="1" noChangeArrowheads="1"/>
+          </p:cNvPicPr>
+          <p:nvPr/>
+        </p:nvPicPr>
+        <p:blipFill>
+          <a:blip r:embed="rId3">
+            <a:extLst>
+              <a:ext uri="{28A0092B-C50C-407E-A947-70E740481C1C}">
+                <a14:useLocalDpi xmlns:a14="http://schemas.microsoft.com/office/drawing/2010/main" val="0"/>
+              </a:ext>
+            </a:extLst>
+          </a:blip>
+          <a:srcRect/>
+          <a:stretch>
+            <a:fillRect/>
+          </a:stretch>
+        </p:blipFill>
+        <p:spPr bwMode="auto">
+          <a:xfrm>
+            <a:off x="8253439" y="2257972"/>
+            <a:ext cx="1540040" cy="709864"/>
+          </a:xfrm>
+          <a:prstGeom prst="rect">
+            <a:avLst/>
+          </a:prstGeom>
+          <a:noFill/>
+          <a:extLst>
+            <a:ext uri="{909E8E84-426E-40DD-AFC4-6F175D3DCCD1}">
+              <a14:hiddenFill xmlns:a14="http://schemas.microsoft.com/office/drawing/2010/main">
+                <a:solidFill>
+                  <a:srgbClr val="FFFFFF"/>
+                </a:solidFill>
+              </a14:hiddenFill>
+            </a:ext>
+          </a:extLst>
+        </p:spPr>
+      </p:pic>
+      <p:pic>
+        <p:nvPicPr>
+          <p:cNvPr id="16" name="Picture 2" descr="Right arrow - Free arrows icons">
+            <a:extLst>
+              <a:ext uri="{FF2B5EF4-FFF2-40B4-BE49-F238E27FC236}">
+                <a16:creationId xmlns:a16="http://schemas.microsoft.com/office/drawing/2014/main" id="{32749115-0A91-3F1E-68E5-5E7C067B7321}"/>
+              </a:ext>
+            </a:extLst>
+          </p:cNvPr>
+          <p:cNvPicPr>
+            <a:picLocks noChangeAspect="1" noChangeArrowheads="1"/>
+          </p:cNvPicPr>
+          <p:nvPr/>
+        </p:nvPicPr>
+        <p:blipFill>
+          <a:blip r:embed="rId3">
+            <a:extLst>
+              <a:ext uri="{28A0092B-C50C-407E-A947-70E740481C1C}">
+                <a14:useLocalDpi xmlns:a14="http://schemas.microsoft.com/office/drawing/2010/main" val="0"/>
+              </a:ext>
+            </a:extLst>
+          </a:blip>
+          <a:srcRect/>
+          <a:stretch>
+            <a:fillRect/>
+          </a:stretch>
+        </p:blipFill>
+        <p:spPr bwMode="auto">
+          <a:xfrm>
+            <a:off x="8257448" y="2918345"/>
+            <a:ext cx="1540040" cy="709864"/>
+          </a:xfrm>
+          <a:prstGeom prst="rect">
+            <a:avLst/>
+          </a:prstGeom>
+          <a:noFill/>
+          <a:extLst>
+            <a:ext uri="{909E8E84-426E-40DD-AFC4-6F175D3DCCD1}">
+              <a14:hiddenFill xmlns:a14="http://schemas.microsoft.com/office/drawing/2010/main">
+                <a:solidFill>
+                  <a:srgbClr val="FFFFFF"/>
+                </a:solidFill>
+              </a14:hiddenFill>
+            </a:ext>
+          </a:extLst>
+        </p:spPr>
+      </p:pic>
+      <p:sp>
+        <p:nvSpPr>
+          <p:cNvPr id="17" name="TextBox 16">
+            <a:extLst>
+              <a:ext uri="{FF2B5EF4-FFF2-40B4-BE49-F238E27FC236}">
+                <a16:creationId xmlns:a16="http://schemas.microsoft.com/office/drawing/2014/main" id="{8D24D682-312E-E7FF-0C2E-0549679828B1}"/>
+              </a:ext>
+            </a:extLst>
+          </p:cNvPr>
+          <p:cNvSpPr txBox="1"/>
+          <p:nvPr/>
+        </p:nvSpPr>
+        <p:spPr>
+          <a:xfrm>
+            <a:off x="237018" y="2697762"/>
+            <a:ext cx="2250918" cy="646331"/>
+          </a:xfrm>
+          <a:prstGeom prst="rect">
+            <a:avLst/>
+          </a:prstGeom>
+          <a:noFill/>
+        </p:spPr>
+        <p:txBody>
+          <a:bodyPr wrap="square" rtlCol="0">
+            <a:spAutoFit/>
+          </a:bodyPr>
+          <a:lstStyle/>
+          <a:p>
+            <a:pPr algn="ctr"/>
+            <a:r>
+              <a:rPr lang="es-CO" dirty="0" err="1">
+                <a:latin typeface="212 Baby Girl" pitchFamily="50" charset="0"/>
+                <a:ea typeface="A little sunshine" panose="02000603000000000000" pitchFamily="2" charset="0"/>
+              </a:rPr>
+              <a:t>Click</a:t>
+            </a:r>
+            <a:r>
+              <a:rPr lang="es-CO" dirty="0">
+                <a:latin typeface="212 Baby Girl" pitchFamily="50" charset="0"/>
+                <a:ea typeface="A little sunshine" panose="02000603000000000000" pitchFamily="2" charset="0"/>
+              </a:rPr>
+              <a:t> para cierre de la imagen</a:t>
+            </a:r>
+          </a:p>
+        </p:txBody>
+      </p:sp>
+      <p:sp>
+        <p:nvSpPr>
+          <p:cNvPr id="18" name="TextBox 17">
+            <a:extLst>
+              <a:ext uri="{FF2B5EF4-FFF2-40B4-BE49-F238E27FC236}">
+                <a16:creationId xmlns:a16="http://schemas.microsoft.com/office/drawing/2014/main" id="{97443BE6-D2F0-CBC9-D1D3-2CF8A0317605}"/>
+              </a:ext>
+            </a:extLst>
+          </p:cNvPr>
+          <p:cNvSpPr txBox="1"/>
+          <p:nvPr/>
+        </p:nvSpPr>
+        <p:spPr>
+          <a:xfrm>
+            <a:off x="9686807" y="1688409"/>
+            <a:ext cx="2250918" cy="646331"/>
+          </a:xfrm>
+          <a:prstGeom prst="rect">
+            <a:avLst/>
+          </a:prstGeom>
+          <a:noFill/>
+        </p:spPr>
+        <p:txBody>
+          <a:bodyPr wrap="square" rtlCol="0">
+            <a:spAutoFit/>
+          </a:bodyPr>
+          <a:lstStyle/>
+          <a:p>
+            <a:pPr algn="ctr"/>
+            <a:r>
+              <a:rPr lang="es-CO" dirty="0" err="1">
+                <a:latin typeface="212 Baby Girl" pitchFamily="50" charset="0"/>
+                <a:ea typeface="A little sunshine" panose="02000603000000000000" pitchFamily="2" charset="0"/>
+              </a:rPr>
+              <a:t>Click</a:t>
+            </a:r>
+            <a:r>
+              <a:rPr lang="es-CO" dirty="0">
+                <a:latin typeface="212 Baby Girl" pitchFamily="50" charset="0"/>
+                <a:ea typeface="A little sunshine" panose="02000603000000000000" pitchFamily="2" charset="0"/>
+              </a:rPr>
+              <a:t> para erosionar la imagen</a:t>
+            </a:r>
+          </a:p>
+        </p:txBody>
+      </p:sp>
+      <p:sp>
+        <p:nvSpPr>
+          <p:cNvPr id="19" name="TextBox 18">
+            <a:extLst>
+              <a:ext uri="{FF2B5EF4-FFF2-40B4-BE49-F238E27FC236}">
+                <a16:creationId xmlns:a16="http://schemas.microsoft.com/office/drawing/2014/main" id="{4F7AECF9-CB55-B744-A7BB-2E61F12247A3}"/>
+              </a:ext>
+            </a:extLst>
+          </p:cNvPr>
+          <p:cNvSpPr txBox="1"/>
+          <p:nvPr/>
+        </p:nvSpPr>
+        <p:spPr>
+          <a:xfrm>
+            <a:off x="9684803" y="2475041"/>
+            <a:ext cx="2250918" cy="646331"/>
+          </a:xfrm>
+          <a:prstGeom prst="rect">
+            <a:avLst/>
+          </a:prstGeom>
+          <a:noFill/>
+        </p:spPr>
+        <p:txBody>
+          <a:bodyPr wrap="square" rtlCol="0">
+            <a:spAutoFit/>
+          </a:bodyPr>
+          <a:lstStyle/>
+          <a:p>
+            <a:pPr algn="ctr"/>
+            <a:r>
+              <a:rPr lang="es-CO" dirty="0" err="1">
+                <a:latin typeface="212 Baby Girl" pitchFamily="50" charset="0"/>
+                <a:ea typeface="A little sunshine" panose="02000603000000000000" pitchFamily="2" charset="0"/>
+              </a:rPr>
+              <a:t>Click</a:t>
+            </a:r>
+            <a:r>
+              <a:rPr lang="es-CO" dirty="0">
+                <a:latin typeface="212 Baby Girl" pitchFamily="50" charset="0"/>
+                <a:ea typeface="A little sunshine" panose="02000603000000000000" pitchFamily="2" charset="0"/>
+              </a:rPr>
+              <a:t> para apertura de la imagen</a:t>
+            </a:r>
+          </a:p>
+        </p:txBody>
+      </p:sp>
+      <p:sp>
+        <p:nvSpPr>
+          <p:cNvPr id="20" name="TextBox 19">
+            <a:extLst>
+              <a:ext uri="{FF2B5EF4-FFF2-40B4-BE49-F238E27FC236}">
+                <a16:creationId xmlns:a16="http://schemas.microsoft.com/office/drawing/2014/main" id="{4BD60602-79B1-C581-A985-0FE3DD5253F1}"/>
+              </a:ext>
+            </a:extLst>
+          </p:cNvPr>
+          <p:cNvSpPr txBox="1"/>
+          <p:nvPr/>
+        </p:nvSpPr>
+        <p:spPr>
+          <a:xfrm>
+            <a:off x="9632469" y="3225049"/>
+            <a:ext cx="2250918" cy="1200329"/>
+          </a:xfrm>
+          <a:prstGeom prst="rect">
+            <a:avLst/>
+          </a:prstGeom>
+          <a:noFill/>
+        </p:spPr>
+        <p:txBody>
+          <a:bodyPr wrap="square" rtlCol="0">
+            <a:spAutoFit/>
+          </a:bodyPr>
+          <a:lstStyle/>
+          <a:p>
+            <a:pPr algn="ctr"/>
+            <a:r>
+              <a:rPr lang="es-CO" dirty="0" err="1">
+                <a:latin typeface="212 Baby Girl" pitchFamily="50" charset="0"/>
+                <a:ea typeface="A little sunshine" panose="02000603000000000000" pitchFamily="2" charset="0"/>
+              </a:rPr>
+              <a:t>Click</a:t>
+            </a:r>
+            <a:r>
+              <a:rPr lang="es-CO" dirty="0">
+                <a:latin typeface="212 Baby Girl" pitchFamily="50" charset="0"/>
+                <a:ea typeface="A little sunshine" panose="02000603000000000000" pitchFamily="2" charset="0"/>
+              </a:rPr>
+              <a:t> para realizar detección de contornos de la imagen</a:t>
+            </a:r>
+          </a:p>
+        </p:txBody>
+      </p:sp>
+      <p:pic>
+        <p:nvPicPr>
+          <p:cNvPr id="21" name="Picture 2" descr="Circle Icons - Free SVG &amp; PNG Circle Images - Noun Project">
+            <a:extLst>
+              <a:ext uri="{FF2B5EF4-FFF2-40B4-BE49-F238E27FC236}">
+                <a16:creationId xmlns:a16="http://schemas.microsoft.com/office/drawing/2014/main" id="{A09A13F2-5E26-6799-54E9-2D8061753EF2}"/>
+              </a:ext>
+            </a:extLst>
+          </p:cNvPr>
+          <p:cNvPicPr>
+            <a:picLocks noChangeAspect="1" noChangeArrowheads="1"/>
+          </p:cNvPicPr>
+          <p:nvPr/>
+        </p:nvPicPr>
+        <p:blipFill>
+          <a:blip r:embed="rId4">
+            <a:extLst>
+              <a:ext uri="{28A0092B-C50C-407E-A947-70E740481C1C}">
+                <a14:useLocalDpi xmlns:a14="http://schemas.microsoft.com/office/drawing/2010/main" val="0"/>
+              </a:ext>
+            </a:extLst>
+          </a:blip>
+          <a:srcRect/>
+          <a:stretch>
+            <a:fillRect/>
+          </a:stretch>
+        </p:blipFill>
+        <p:spPr bwMode="auto">
+          <a:xfrm>
+            <a:off x="3971619" y="1688409"/>
+            <a:ext cx="4017350" cy="1939402"/>
+          </a:xfrm>
+          <a:prstGeom prst="rect">
+            <a:avLst/>
+          </a:prstGeom>
+          <a:noFill/>
+          <a:extLst>
+            <a:ext uri="{909E8E84-426E-40DD-AFC4-6F175D3DCCD1}">
+              <a14:hiddenFill xmlns:a14="http://schemas.microsoft.com/office/drawing/2010/main">
+                <a:solidFill>
+                  <a:srgbClr val="FFFFFF"/>
+                </a:solidFill>
+              </a14:hiddenFill>
+            </a:ext>
+          </a:extLst>
+        </p:spPr>
+      </p:pic>
+      <p:sp>
+        <p:nvSpPr>
+          <p:cNvPr id="23" name="TextBox 22">
+            <a:extLst>
+              <a:ext uri="{FF2B5EF4-FFF2-40B4-BE49-F238E27FC236}">
+                <a16:creationId xmlns:a16="http://schemas.microsoft.com/office/drawing/2014/main" id="{446CC9A7-5A8C-39AB-F2A1-E2BFAF13A8FC}"/>
+              </a:ext>
+            </a:extLst>
+          </p:cNvPr>
+          <p:cNvSpPr txBox="1"/>
+          <p:nvPr/>
+        </p:nvSpPr>
+        <p:spPr>
+          <a:xfrm>
+            <a:off x="6215865" y="1596526"/>
+            <a:ext cx="950719" cy="584775"/>
+          </a:xfrm>
+          <a:prstGeom prst="rect">
+            <a:avLst/>
+          </a:prstGeom>
+          <a:noFill/>
+        </p:spPr>
+        <p:txBody>
+          <a:bodyPr wrap="square" rtlCol="0">
+            <a:spAutoFit/>
+          </a:bodyPr>
+          <a:lstStyle/>
+          <a:p>
+            <a:pPr algn="ctr"/>
+            <a:r>
+              <a:rPr lang="es-CO" sz="3200" dirty="0">
+                <a:latin typeface="212 Baby Girl" pitchFamily="50" charset="0"/>
+                <a:ea typeface="A little sunshine" panose="02000603000000000000" pitchFamily="2" charset="0"/>
+              </a:rPr>
+              <a:t>2</a:t>
+            </a:r>
+          </a:p>
+        </p:txBody>
+      </p:sp>
+      <p:sp>
+        <p:nvSpPr>
+          <p:cNvPr id="24" name="TextBox 23">
+            <a:extLst>
+              <a:ext uri="{FF2B5EF4-FFF2-40B4-BE49-F238E27FC236}">
+                <a16:creationId xmlns:a16="http://schemas.microsoft.com/office/drawing/2014/main" id="{DF1687FB-0F3F-11BB-D463-65948984C6B1}"/>
+              </a:ext>
+            </a:extLst>
+          </p:cNvPr>
+          <p:cNvSpPr txBox="1"/>
+          <p:nvPr/>
+        </p:nvSpPr>
+        <p:spPr>
+          <a:xfrm>
+            <a:off x="4565766" y="5603132"/>
+            <a:ext cx="1925053" cy="369332"/>
+          </a:xfrm>
+          <a:prstGeom prst="rect">
+            <a:avLst/>
+          </a:prstGeom>
+          <a:noFill/>
+        </p:spPr>
+        <p:txBody>
+          <a:bodyPr wrap="square" rtlCol="0">
+            <a:spAutoFit/>
+          </a:bodyPr>
+          <a:lstStyle/>
+          <a:p>
+            <a:pPr algn="ctr"/>
+            <a:r>
+              <a:rPr lang="es-CO" u="sng" dirty="0">
+                <a:latin typeface="212 Baby Girl" pitchFamily="50" charset="0"/>
+                <a:ea typeface="A little sunshine" panose="02000603000000000000" pitchFamily="2" charset="0"/>
+              </a:rPr>
+              <a:t>Imagen original</a:t>
+            </a:r>
+          </a:p>
+        </p:txBody>
+      </p:sp>
+      <p:sp>
+        <p:nvSpPr>
+          <p:cNvPr id="25" name="TextBox 24">
+            <a:extLst>
+              <a:ext uri="{FF2B5EF4-FFF2-40B4-BE49-F238E27FC236}">
+                <a16:creationId xmlns:a16="http://schemas.microsoft.com/office/drawing/2014/main" id="{E5F84604-C110-221C-A4D7-954BCF6F08EB}"/>
+              </a:ext>
+            </a:extLst>
+          </p:cNvPr>
+          <p:cNvSpPr txBox="1"/>
+          <p:nvPr/>
+        </p:nvSpPr>
+        <p:spPr>
+          <a:xfrm>
+            <a:off x="9023459" y="5611067"/>
+            <a:ext cx="2346383" cy="369332"/>
+          </a:xfrm>
+          <a:prstGeom prst="rect">
+            <a:avLst/>
+          </a:prstGeom>
+          <a:noFill/>
+        </p:spPr>
+        <p:txBody>
+          <a:bodyPr wrap="square" rtlCol="0">
+            <a:spAutoFit/>
+          </a:bodyPr>
+          <a:lstStyle/>
+          <a:p>
+            <a:pPr algn="ctr"/>
+            <a:r>
+              <a:rPr lang="es-CO" u="sng" dirty="0">
+                <a:latin typeface="212 Baby Girl" pitchFamily="50" charset="0"/>
+                <a:ea typeface="A little sunshine" panose="02000603000000000000" pitchFamily="2" charset="0"/>
+              </a:rPr>
+              <a:t>Imagen procesada</a:t>
+            </a:r>
+          </a:p>
+        </p:txBody>
+      </p:sp>
+    </p:spTree>
+    <p:extLst>
+      <p:ext uri="{BB962C8B-B14F-4D97-AF65-F5344CB8AC3E}">
+        <p14:creationId xmlns:p14="http://schemas.microsoft.com/office/powerpoint/2010/main" val="3996274440"/>
+      </p:ext>
+    </p:extLst>
+  </p:cSld>
+  <p:clrMapOvr>
+    <a:masterClrMapping/>
+  </p:clrMapOvr>
+</p:sld>
+</file>
+
+<file path=ppt/slides/slide6.xml><?xml version="1.0" encoding="utf-8"?>
+<p:sld xmlns:a="http://schemas.openxmlformats.org/drawingml/2006/main" xmlns:r="http://schemas.openxmlformats.org/officeDocument/2006/relationships" xmlns:p="http://schemas.openxmlformats.org/presentationml/2006/main">
+  <p:cSld>
+    <p:spTree>
+      <p:nvGrpSpPr>
+        <p:cNvPr id="1" name=""/>
+        <p:cNvGrpSpPr/>
+        <p:nvPr/>
+      </p:nvGrpSpPr>
+      <p:grpSpPr>
+        <a:xfrm>
+          <a:off x="0" y="0"/>
+          <a:ext cx="0" cy="0"/>
+          <a:chOff x="0" y="0"/>
+          <a:chExt cx="0" cy="0"/>
+        </a:xfrm>
+      </p:grpSpPr>
+      <p:pic>
+        <p:nvPicPr>
+          <p:cNvPr id="5" name="Picture 4">
+            <a:extLst>
+              <a:ext uri="{FF2B5EF4-FFF2-40B4-BE49-F238E27FC236}">
+                <a16:creationId xmlns:a16="http://schemas.microsoft.com/office/drawing/2014/main" id="{358C3186-94F0-3B81-8C70-3314ADEA8BAC}"/>
+              </a:ext>
+            </a:extLst>
+          </p:cNvPr>
+          <p:cNvPicPr>
+            <a:picLocks noChangeAspect="1"/>
+          </p:cNvPicPr>
+          <p:nvPr/>
+        </p:nvPicPr>
+        <p:blipFill>
+          <a:blip r:embed="rId2"/>
+          <a:stretch>
+            <a:fillRect/>
+          </a:stretch>
+        </p:blipFill>
+        <p:spPr>
+          <a:xfrm>
+            <a:off x="2108195" y="893339"/>
+            <a:ext cx="8847036" cy="5400000"/>
+          </a:xfrm>
+          <a:prstGeom prst="rect">
+            <a:avLst/>
+          </a:prstGeom>
+        </p:spPr>
+      </p:pic>
+      <p:sp>
+        <p:nvSpPr>
+          <p:cNvPr id="6" name="TextBox 5">
+            <a:extLst>
+              <a:ext uri="{FF2B5EF4-FFF2-40B4-BE49-F238E27FC236}">
+                <a16:creationId xmlns:a16="http://schemas.microsoft.com/office/drawing/2014/main" id="{12812828-FAAD-6AB7-DDCC-EFFE5F6C0863}"/>
+              </a:ext>
+            </a:extLst>
+          </p:cNvPr>
+          <p:cNvSpPr txBox="1"/>
+          <p:nvPr/>
+        </p:nvSpPr>
+        <p:spPr>
+          <a:xfrm>
+            <a:off x="505325" y="62067"/>
+            <a:ext cx="5065295" cy="1015663"/>
+          </a:xfrm>
+          <a:prstGeom prst="rect">
+            <a:avLst/>
+          </a:prstGeom>
+          <a:noFill/>
+        </p:spPr>
+        <p:txBody>
+          <a:bodyPr wrap="square" rtlCol="0">
+            <a:spAutoFit/>
+          </a:bodyPr>
+          <a:lstStyle/>
+          <a:p>
+            <a:r>
+              <a:rPr lang="es-CO" sz="6000" dirty="0">
+                <a:latin typeface="Friendly Schoolmates" panose="02000500000000000000" pitchFamily="2" charset="0"/>
+                <a:ea typeface="A little sunshine" panose="02000603000000000000" pitchFamily="2" charset="0"/>
+              </a:rPr>
+              <a:t>ARCHIVOS MAT</a:t>
+            </a:r>
+          </a:p>
+        </p:txBody>
+      </p:sp>
+      <p:pic>
+        <p:nvPicPr>
+          <p:cNvPr id="2050" name="Picture 2" descr="Right arrow - Free arrows icons">
+            <a:extLst>
+              <a:ext uri="{FF2B5EF4-FFF2-40B4-BE49-F238E27FC236}">
+                <a16:creationId xmlns:a16="http://schemas.microsoft.com/office/drawing/2014/main" id="{E931B4D5-2D2C-3C3C-5A89-788C85395FF9}"/>
+              </a:ext>
+            </a:extLst>
+          </p:cNvPr>
+          <p:cNvPicPr>
+            <a:picLocks noChangeAspect="1" noChangeArrowheads="1"/>
+          </p:cNvPicPr>
+          <p:nvPr/>
+        </p:nvPicPr>
+        <p:blipFill>
+          <a:blip r:embed="rId3">
+            <a:extLst>
+              <a:ext uri="{28A0092B-C50C-407E-A947-70E740481C1C}">
+                <a14:useLocalDpi xmlns:a14="http://schemas.microsoft.com/office/drawing/2010/main" val="0"/>
+              </a:ext>
+            </a:extLst>
+          </a:blip>
+          <a:srcRect/>
+          <a:stretch>
+            <a:fillRect/>
+          </a:stretch>
+        </p:blipFill>
+        <p:spPr bwMode="auto">
+          <a:xfrm flipV="1">
+            <a:off x="9871217" y="1794080"/>
+            <a:ext cx="709865" cy="709864"/>
+          </a:xfrm>
+          <a:prstGeom prst="rect">
+            <a:avLst/>
+          </a:prstGeom>
+          <a:noFill/>
+          <a:extLst>
+            <a:ext uri="{909E8E84-426E-40DD-AFC4-6F175D3DCCD1}">
+              <a14:hiddenFill xmlns:a14="http://schemas.microsoft.com/office/drawing/2010/main">
+                <a:solidFill>
+                  <a:srgbClr val="FFFFFF"/>
+                </a:solidFill>
+              </a14:hiddenFill>
+            </a:ext>
+          </a:extLst>
+        </p:spPr>
+      </p:pic>
+      <p:sp>
+        <p:nvSpPr>
+          <p:cNvPr id="7" name="TextBox 6">
+            <a:extLst>
+              <a:ext uri="{FF2B5EF4-FFF2-40B4-BE49-F238E27FC236}">
+                <a16:creationId xmlns:a16="http://schemas.microsoft.com/office/drawing/2014/main" id="{3BD640C0-ABC6-5A36-8DC9-030D6533BB07}"/>
+              </a:ext>
+            </a:extLst>
+          </p:cNvPr>
+          <p:cNvSpPr txBox="1"/>
+          <p:nvPr/>
+        </p:nvSpPr>
+        <p:spPr>
+          <a:xfrm>
+            <a:off x="10400471" y="1932316"/>
+            <a:ext cx="1925053" cy="646331"/>
+          </a:xfrm>
+          <a:prstGeom prst="rect">
+            <a:avLst/>
+          </a:prstGeom>
+          <a:noFill/>
+        </p:spPr>
+        <p:txBody>
+          <a:bodyPr wrap="square" rtlCol="0">
+            <a:spAutoFit/>
+          </a:bodyPr>
+          <a:lstStyle/>
+          <a:p>
+            <a:pPr algn="ctr"/>
+            <a:r>
+              <a:rPr lang="es-CO" dirty="0">
+                <a:latin typeface="212 Baby Girl" pitchFamily="50" charset="0"/>
+                <a:ea typeface="A little sunshine" panose="02000603000000000000" pitchFamily="2" charset="0"/>
+              </a:rPr>
+              <a:t>2.Seleccionar el arreglo</a:t>
+            </a:r>
+          </a:p>
+        </p:txBody>
+      </p:sp>
+      <p:pic>
+        <p:nvPicPr>
+          <p:cNvPr id="10" name="Picture 2" descr="Right arrow - Free arrows icons">
+            <a:extLst>
+              <a:ext uri="{FF2B5EF4-FFF2-40B4-BE49-F238E27FC236}">
+                <a16:creationId xmlns:a16="http://schemas.microsoft.com/office/drawing/2014/main" id="{08E2ED56-0C5B-8355-171B-818FECCED02D}"/>
+              </a:ext>
+            </a:extLst>
+          </p:cNvPr>
+          <p:cNvPicPr>
+            <a:picLocks noChangeAspect="1" noChangeArrowheads="1"/>
+          </p:cNvPicPr>
+          <p:nvPr/>
+        </p:nvPicPr>
+        <p:blipFill>
+          <a:blip r:embed="rId3">
+            <a:extLst>
+              <a:ext uri="{28A0092B-C50C-407E-A947-70E740481C1C}">
+                <a14:useLocalDpi xmlns:a14="http://schemas.microsoft.com/office/drawing/2010/main" val="0"/>
+              </a:ext>
+            </a:extLst>
+          </a:blip>
+          <a:srcRect/>
+          <a:stretch>
+            <a:fillRect/>
+          </a:stretch>
+        </p:blipFill>
+        <p:spPr bwMode="auto">
+          <a:xfrm rot="10800000">
+            <a:off x="1992916" y="5364496"/>
+            <a:ext cx="719081" cy="709864"/>
+          </a:xfrm>
+          <a:prstGeom prst="rect">
+            <a:avLst/>
+          </a:prstGeom>
+          <a:noFill/>
+          <a:extLst>
+            <a:ext uri="{909E8E84-426E-40DD-AFC4-6F175D3DCCD1}">
+              <a14:hiddenFill xmlns:a14="http://schemas.microsoft.com/office/drawing/2010/main">
+                <a:solidFill>
+                  <a:srgbClr val="FFFFFF"/>
+                </a:solidFill>
+              </a14:hiddenFill>
+            </a:ext>
+          </a:extLst>
+        </p:spPr>
+      </p:pic>
+      <p:sp>
+        <p:nvSpPr>
+          <p:cNvPr id="11" name="TextBox 10">
+            <a:extLst>
+              <a:ext uri="{FF2B5EF4-FFF2-40B4-BE49-F238E27FC236}">
+                <a16:creationId xmlns:a16="http://schemas.microsoft.com/office/drawing/2014/main" id="{E5498E99-DC67-FFF0-C870-51A575355FFA}"/>
+              </a:ext>
+            </a:extLst>
+          </p:cNvPr>
+          <p:cNvSpPr txBox="1"/>
+          <p:nvPr/>
+        </p:nvSpPr>
+        <p:spPr>
+          <a:xfrm>
+            <a:off x="228955" y="5544747"/>
+            <a:ext cx="1925053" cy="646331"/>
+          </a:xfrm>
+          <a:prstGeom prst="rect">
+            <a:avLst/>
+          </a:prstGeom>
+          <a:noFill/>
+        </p:spPr>
+        <p:txBody>
+          <a:bodyPr wrap="square" rtlCol="0">
+            <a:spAutoFit/>
+          </a:bodyPr>
+          <a:lstStyle/>
+          <a:p>
+            <a:pPr algn="ctr"/>
+            <a:r>
+              <a:rPr lang="es-CO">
+                <a:latin typeface="212 Baby Girl" pitchFamily="50" charset="0"/>
+                <a:ea typeface="A little sunshine" panose="02000603000000000000" pitchFamily="2" charset="0"/>
+              </a:rPr>
+              <a:t>7.Click </a:t>
+            </a:r>
+            <a:r>
+              <a:rPr lang="es-CO" dirty="0">
+                <a:latin typeface="212 Baby Girl" pitchFamily="50" charset="0"/>
+                <a:ea typeface="A little sunshine" panose="02000603000000000000" pitchFamily="2" charset="0"/>
+              </a:rPr>
+              <a:t>para regresar al menú</a:t>
             </a:r>
           </a:p>
         </p:txBody>
@@ -5959,7 +7032,7 @@
                 <a:latin typeface="212 Baby Girl" pitchFamily="50" charset="0"/>
                 <a:ea typeface="A little sunshine" panose="02000603000000000000" pitchFamily="2" charset="0"/>
               </a:rPr>
-              <a:t>Ingresar  valor Mínimo  de frecuencia</a:t>
+              <a:t>4.Ingresar  valor Mínimo  de frecuencia</a:t>
             </a:r>
           </a:p>
         </p:txBody>
@@ -6045,7 +7118,7 @@
                 <a:latin typeface="212 Baby Girl" pitchFamily="50" charset="0"/>
                 <a:ea typeface="A little sunshine" panose="02000603000000000000" pitchFamily="2" charset="0"/>
               </a:rPr>
-              <a:t>Seleccionar segmento de canales o único canal</a:t>
+              <a:t>3.Seleccionar segmento de canales o único canal</a:t>
             </a:r>
           </a:p>
         </p:txBody>
@@ -6131,7 +7204,7 @@
                 <a:latin typeface="212 Baby Girl" pitchFamily="50" charset="0"/>
                 <a:ea typeface="A little sunshine" panose="02000603000000000000" pitchFamily="2" charset="0"/>
               </a:rPr>
-              <a:t>Ingresar  valor Máximo  de frecuencia</a:t>
+              <a:t>5.Ingresar  valor Máximo  de frecuencia</a:t>
             </a:r>
           </a:p>
         </p:txBody>
@@ -6213,18 +7286,11 @@
           <a:p>
             <a:pPr algn="ctr"/>
             <a:r>
-              <a:rPr lang="es-CO" dirty="0" err="1">
-                <a:latin typeface="212 Baby Girl" pitchFamily="50" charset="0"/>
-                <a:ea typeface="A little sunshine" panose="02000603000000000000" pitchFamily="2" charset="0"/>
-              </a:rPr>
-              <a:t>Click</a:t>
-            </a:r>
-            <a:r>
               <a:rPr lang="es-CO" dirty="0">
                 <a:latin typeface="212 Baby Girl" pitchFamily="50" charset="0"/>
                 <a:ea typeface="A little sunshine" panose="02000603000000000000" pitchFamily="2" charset="0"/>
               </a:rPr>
-              <a:t> para visualizar la señal</a:t>
+              <a:t>6.Click para visualizar la señal</a:t>
             </a:r>
           </a:p>
         </p:txBody>
@@ -6306,18 +7372,11 @@
           <a:p>
             <a:pPr algn="ctr"/>
             <a:r>
-              <a:rPr lang="es-CO" dirty="0" err="1">
-                <a:latin typeface="212 Baby Girl" pitchFamily="50" charset="0"/>
-                <a:ea typeface="A little sunshine" panose="02000603000000000000" pitchFamily="2" charset="0"/>
-              </a:rPr>
-              <a:t>Click</a:t>
-            </a:r>
-            <a:r>
               <a:rPr lang="es-CO" dirty="0">
                 <a:latin typeface="212 Baby Girl" pitchFamily="50" charset="0"/>
                 <a:ea typeface="A little sunshine" panose="02000603000000000000" pitchFamily="2" charset="0"/>
               </a:rPr>
-              <a:t> para cargar la señal</a:t>
+              <a:t>1.Click para cargar la señal</a:t>
             </a:r>
           </a:p>
         </p:txBody>

</xml_diff>